<commit_message>
updated word and ppt
</commit_message>
<xml_diff>
--- a/MV4025 Lab5-v3/FinalPresentationSchutt.Fetterolf.pptx
+++ b/MV4025 Lab5-v3/FinalPresentationSchutt.Fetterolf.pptx
@@ -9,6 +9,7 @@
     <p:sldId id="257" r:id="rId3"/>
     <p:sldId id="258" r:id="rId4"/>
     <p:sldId id="259" r:id="rId5"/>
+    <p:sldId id="260" r:id="rId6"/>
   </p:sldIdLst>
   <p:sldSz cx="12192000" cy="6858000"/>
   <p:notesSz cx="6858000" cy="9144000"/>
@@ -118,7 +119,7 @@
 <file path=ppt/revisionInfo.xml><?xml version="1.0" encoding="utf-8"?>
 <p1510:revInfo xmlns:a="http://schemas.openxmlformats.org/drawingml/2006/main" xmlns:r="http://schemas.openxmlformats.org/officeDocument/2006/relationships" xmlns:p1510="http://schemas.microsoft.com/office/powerpoint/2015/10/main">
   <p1510:revLst>
-    <p1510:client id="{DBA145AF-5D9B-4404-A7D4-257C7EB6BB05}" v="20" dt="2019-09-13T03:19:51.916"/>
+    <p1510:client id="{DBA145AF-5D9B-4404-A7D4-257C7EB6BB05}" v="22" dt="2019-09-13T16:18:54.242"/>
   </p1510:revLst>
 </p1510:revInfo>
 </file>
@@ -128,7 +129,7 @@
   <pc:docChgLst>
     <pc:chgData name="Colton Fetterolf" userId="abc5913bc5523338" providerId="LiveId" clId="{DBA145AF-5D9B-4404-A7D4-257C7EB6BB05}"/>
     <pc:docChg chg="custSel mod addSld delSld modSld sldOrd">
-      <pc:chgData name="Colton Fetterolf" userId="abc5913bc5523338" providerId="LiveId" clId="{DBA145AF-5D9B-4404-A7D4-257C7EB6BB05}" dt="2019-09-13T03:19:52.083" v="644" actId="27636"/>
+      <pc:chgData name="Colton Fetterolf" userId="abc5913bc5523338" providerId="LiveId" clId="{DBA145AF-5D9B-4404-A7D4-257C7EB6BB05}" dt="2019-09-13T16:19:35.608" v="886" actId="20577"/>
       <pc:docMkLst>
         <pc:docMk/>
       </pc:docMkLst>
@@ -242,7 +243,7 @@
         </pc:cxnChg>
       </pc:sldChg>
       <pc:sldChg chg="modSp add">
-        <pc:chgData name="Colton Fetterolf" userId="abc5913bc5523338" providerId="LiveId" clId="{DBA145AF-5D9B-4404-A7D4-257C7EB6BB05}" dt="2019-09-13T03:19:27.067" v="610" actId="20577"/>
+        <pc:chgData name="Colton Fetterolf" userId="abc5913bc5523338" providerId="LiveId" clId="{DBA145AF-5D9B-4404-A7D4-257C7EB6BB05}" dt="2019-09-13T16:16:19.682" v="719" actId="20577"/>
         <pc:sldMkLst>
           <pc:docMk/>
           <pc:sldMk cId="2887988079" sldId="258"/>
@@ -256,7 +257,7 @@
           </ac:spMkLst>
         </pc:spChg>
         <pc:spChg chg="mod">
-          <ac:chgData name="Colton Fetterolf" userId="abc5913bc5523338" providerId="LiveId" clId="{DBA145AF-5D9B-4404-A7D4-257C7EB6BB05}" dt="2019-09-13T03:19:27.067" v="610" actId="20577"/>
+          <ac:chgData name="Colton Fetterolf" userId="abc5913bc5523338" providerId="LiveId" clId="{DBA145AF-5D9B-4404-A7D4-257C7EB6BB05}" dt="2019-09-13T16:16:19.682" v="719" actId="20577"/>
           <ac:spMkLst>
             <pc:docMk/>
             <pc:sldMk cId="2887988079" sldId="258"/>
@@ -265,13 +266,13 @@
         </pc:spChg>
       </pc:sldChg>
       <pc:sldChg chg="modSp add">
-        <pc:chgData name="Colton Fetterolf" userId="abc5913bc5523338" providerId="LiveId" clId="{DBA145AF-5D9B-4404-A7D4-257C7EB6BB05}" dt="2019-09-13T03:19:52.083" v="644" actId="27636"/>
+        <pc:chgData name="Colton Fetterolf" userId="abc5913bc5523338" providerId="LiveId" clId="{DBA145AF-5D9B-4404-A7D4-257C7EB6BB05}" dt="2019-09-13T16:17:19.795" v="795" actId="27636"/>
         <pc:sldMkLst>
           <pc:docMk/>
           <pc:sldMk cId="3268148253" sldId="259"/>
         </pc:sldMkLst>
         <pc:spChg chg="mod">
-          <ac:chgData name="Colton Fetterolf" userId="abc5913bc5523338" providerId="LiveId" clId="{DBA145AF-5D9B-4404-A7D4-257C7EB6BB05}" dt="2019-09-13T03:19:45.050" v="642" actId="20577"/>
+          <ac:chgData name="Colton Fetterolf" userId="abc5913bc5523338" providerId="LiveId" clId="{DBA145AF-5D9B-4404-A7D4-257C7EB6BB05}" dt="2019-09-13T16:16:31.965" v="731" actId="20577"/>
           <ac:spMkLst>
             <pc:docMk/>
             <pc:sldMk cId="3268148253" sldId="259"/>
@@ -279,11 +280,34 @@
           </ac:spMkLst>
         </pc:spChg>
         <pc:spChg chg="mod">
-          <ac:chgData name="Colton Fetterolf" userId="abc5913bc5523338" providerId="LiveId" clId="{DBA145AF-5D9B-4404-A7D4-257C7EB6BB05}" dt="2019-09-13T03:19:52.083" v="644" actId="27636"/>
+          <ac:chgData name="Colton Fetterolf" userId="abc5913bc5523338" providerId="LiveId" clId="{DBA145AF-5D9B-4404-A7D4-257C7EB6BB05}" dt="2019-09-13T16:17:19.795" v="795" actId="27636"/>
           <ac:spMkLst>
             <pc:docMk/>
             <pc:sldMk cId="3268148253" sldId="259"/>
             <ac:spMk id="3" creationId="{C8749BDB-E283-4312-9828-3EFA9E682D3B}"/>
+          </ac:spMkLst>
+        </pc:spChg>
+      </pc:sldChg>
+      <pc:sldChg chg="modSp add">
+        <pc:chgData name="Colton Fetterolf" userId="abc5913bc5523338" providerId="LiveId" clId="{DBA145AF-5D9B-4404-A7D4-257C7EB6BB05}" dt="2019-09-13T16:19:35.608" v="886" actId="20577"/>
+        <pc:sldMkLst>
+          <pc:docMk/>
+          <pc:sldMk cId="22519026" sldId="260"/>
+        </pc:sldMkLst>
+        <pc:spChg chg="mod">
+          <ac:chgData name="Colton Fetterolf" userId="abc5913bc5523338" providerId="LiveId" clId="{DBA145AF-5D9B-4404-A7D4-257C7EB6BB05}" dt="2019-09-13T16:19:06.810" v="806" actId="20577"/>
+          <ac:spMkLst>
+            <pc:docMk/>
+            <pc:sldMk cId="22519026" sldId="260"/>
+            <ac:spMk id="2" creationId="{481CCF69-40F8-469A-8249-4621AEE13702}"/>
+          </ac:spMkLst>
+        </pc:spChg>
+        <pc:spChg chg="mod">
+          <ac:chgData name="Colton Fetterolf" userId="abc5913bc5523338" providerId="LiveId" clId="{DBA145AF-5D9B-4404-A7D4-257C7EB6BB05}" dt="2019-09-13T16:19:35.608" v="886" actId="20577"/>
+          <ac:spMkLst>
+            <pc:docMk/>
+            <pc:sldMk cId="22519026" sldId="260"/>
+            <ac:spMk id="3" creationId="{528C55F2-14F3-464A-9B0C-BF461E8E4326}"/>
           </ac:spMkLst>
         </pc:spChg>
       </pc:sldChg>
@@ -477,7 +501,7 @@
           <a:p>
             <a:fld id="{A99E6A8D-3EF2-489F-A7BF-6EA54CB4A9F3}" type="datetimeFigureOut">
               <a:rPr lang="en-US" smtClean="0"/>
-              <a:t>9/12/2019</a:t>
+              <a:t>9/13/2019</a:t>
             </a:fld>
             <a:endParaRPr lang="en-US"/>
           </a:p>
@@ -780,7 +804,7 @@
           <a:p>
             <a:fld id="{A99E6A8D-3EF2-489F-A7BF-6EA54CB4A9F3}" type="datetimeFigureOut">
               <a:rPr lang="en-US" smtClean="0"/>
-              <a:t>9/12/2019</a:t>
+              <a:t>9/13/2019</a:t>
             </a:fld>
             <a:endParaRPr lang="en-US"/>
           </a:p>
@@ -972,7 +996,7 @@
           <a:p>
             <a:fld id="{A99E6A8D-3EF2-489F-A7BF-6EA54CB4A9F3}" type="datetimeFigureOut">
               <a:rPr lang="en-US" smtClean="0"/>
-              <a:t>9/12/2019</a:t>
+              <a:t>9/13/2019</a:t>
             </a:fld>
             <a:endParaRPr lang="en-US"/>
           </a:p>
@@ -1233,7 +1257,7 @@
           <a:p>
             <a:fld id="{A99E6A8D-3EF2-489F-A7BF-6EA54CB4A9F3}" type="datetimeFigureOut">
               <a:rPr lang="en-US" smtClean="0"/>
-              <a:t>9/12/2019</a:t>
+              <a:t>9/13/2019</a:t>
             </a:fld>
             <a:endParaRPr lang="en-US"/>
           </a:p>
@@ -1657,7 +1681,7 @@
           <a:p>
             <a:fld id="{A99E6A8D-3EF2-489F-A7BF-6EA54CB4A9F3}" type="datetimeFigureOut">
               <a:rPr lang="en-US" smtClean="0"/>
-              <a:t>9/12/2019</a:t>
+              <a:t>9/13/2019</a:t>
             </a:fld>
             <a:endParaRPr lang="en-US"/>
           </a:p>
@@ -2194,7 +2218,7 @@
           <a:p>
             <a:fld id="{A99E6A8D-3EF2-489F-A7BF-6EA54CB4A9F3}" type="datetimeFigureOut">
               <a:rPr lang="en-US" smtClean="0"/>
-              <a:t>9/12/2019</a:t>
+              <a:t>9/13/2019</a:t>
             </a:fld>
             <a:endParaRPr lang="en-US"/>
           </a:p>
@@ -3058,7 +3082,7 @@
           <a:p>
             <a:fld id="{A99E6A8D-3EF2-489F-A7BF-6EA54CB4A9F3}" type="datetimeFigureOut">
               <a:rPr lang="en-US" smtClean="0"/>
-              <a:t>9/12/2019</a:t>
+              <a:t>9/13/2019</a:t>
             </a:fld>
             <a:endParaRPr lang="en-US"/>
           </a:p>
@@ -3228,7 +3252,7 @@
           <a:p>
             <a:fld id="{A99E6A8D-3EF2-489F-A7BF-6EA54CB4A9F3}" type="datetimeFigureOut">
               <a:rPr lang="en-US" smtClean="0"/>
-              <a:t>9/12/2019</a:t>
+              <a:t>9/13/2019</a:t>
             </a:fld>
             <a:endParaRPr lang="en-US"/>
           </a:p>
@@ -3412,7 +3436,7 @@
           <a:p>
             <a:fld id="{A99E6A8D-3EF2-489F-A7BF-6EA54CB4A9F3}" type="datetimeFigureOut">
               <a:rPr lang="en-US" smtClean="0"/>
-              <a:t>9/12/2019</a:t>
+              <a:t>9/13/2019</a:t>
             </a:fld>
             <a:endParaRPr lang="en-US"/>
           </a:p>
@@ -3587,7 +3611,7 @@
           <a:p>
             <a:fld id="{A99E6A8D-3EF2-489F-A7BF-6EA54CB4A9F3}" type="datetimeFigureOut">
               <a:rPr lang="en-US" smtClean="0"/>
-              <a:t>9/12/2019</a:t>
+              <a:t>9/13/2019</a:t>
             </a:fld>
             <a:endParaRPr lang="en-US"/>
           </a:p>
@@ -3831,7 +3855,7 @@
           <a:p>
             <a:fld id="{A99E6A8D-3EF2-489F-A7BF-6EA54CB4A9F3}" type="datetimeFigureOut">
               <a:rPr lang="en-US" smtClean="0"/>
-              <a:t>9/12/2019</a:t>
+              <a:t>9/13/2019</a:t>
             </a:fld>
             <a:endParaRPr lang="en-US"/>
           </a:p>
@@ -4072,7 +4096,7 @@
           <a:p>
             <a:fld id="{A99E6A8D-3EF2-489F-A7BF-6EA54CB4A9F3}" type="datetimeFigureOut">
               <a:rPr lang="en-US" smtClean="0"/>
-              <a:t>9/12/2019</a:t>
+              <a:t>9/13/2019</a:t>
             </a:fld>
             <a:endParaRPr lang="en-US"/>
           </a:p>
@@ -4538,7 +4562,7 @@
           <a:p>
             <a:fld id="{A99E6A8D-3EF2-489F-A7BF-6EA54CB4A9F3}" type="datetimeFigureOut">
               <a:rPr lang="en-US" smtClean="0"/>
-              <a:t>9/12/2019</a:t>
+              <a:t>9/13/2019</a:t>
             </a:fld>
             <a:endParaRPr lang="en-US"/>
           </a:p>
@@ -4656,7 +4680,7 @@
           <a:p>
             <a:fld id="{A99E6A8D-3EF2-489F-A7BF-6EA54CB4A9F3}" type="datetimeFigureOut">
               <a:rPr lang="en-US" smtClean="0"/>
-              <a:t>9/12/2019</a:t>
+              <a:t>9/13/2019</a:t>
             </a:fld>
             <a:endParaRPr lang="en-US"/>
           </a:p>
@@ -4751,7 +4775,7 @@
           <a:p>
             <a:fld id="{A99E6A8D-3EF2-489F-A7BF-6EA54CB4A9F3}" type="datetimeFigureOut">
               <a:rPr lang="en-US" smtClean="0"/>
-              <a:t>9/12/2019</a:t>
+              <a:t>9/13/2019</a:t>
             </a:fld>
             <a:endParaRPr lang="en-US"/>
           </a:p>
@@ -5006,7 +5030,7 @@
           <a:p>
             <a:fld id="{A99E6A8D-3EF2-489F-A7BF-6EA54CB4A9F3}" type="datetimeFigureOut">
               <a:rPr lang="en-US" smtClean="0"/>
-              <a:t>9/12/2019</a:t>
+              <a:t>9/13/2019</a:t>
             </a:fld>
             <a:endParaRPr lang="en-US"/>
           </a:p>
@@ -5306,7 +5330,7 @@
           <a:p>
             <a:fld id="{A99E6A8D-3EF2-489F-A7BF-6EA54CB4A9F3}" type="datetimeFigureOut">
               <a:rPr lang="en-US" smtClean="0"/>
-              <a:t>9/12/2019</a:t>
+              <a:t>9/13/2019</a:t>
             </a:fld>
             <a:endParaRPr lang="en-US"/>
           </a:p>
@@ -5540,7 +5564,7 @@
           <a:p>
             <a:fld id="{A99E6A8D-3EF2-489F-A7BF-6EA54CB4A9F3}" type="datetimeFigureOut">
               <a:rPr lang="en-US" smtClean="0"/>
-              <a:t>9/12/2019</a:t>
+              <a:t>9/13/2019</a:t>
             </a:fld>
             <a:endParaRPr lang="en-US"/>
           </a:p>
@@ -6648,6 +6672,25 @@
               <a:t>Massing firepower projection on enemy</a:t>
             </a:r>
           </a:p>
+          <a:p>
+            <a:pPr lvl="2"/>
+            <a:r>
+              <a:rPr lang="en-US" dirty="0"/>
+              <a:t>Close to Target</a:t>
+            </a:r>
+          </a:p>
+          <a:p>
+            <a:pPr lvl="3"/>
+            <a:r>
+              <a:rPr lang="en-US" dirty="0"/>
+              <a:t>Prevent entities from straying away from the </a:t>
+            </a:r>
+            <a:r>
+              <a:rPr lang="en-US" dirty="0" err="1"/>
+              <a:t>tagret</a:t>
+            </a:r>
+            <a:endParaRPr lang="en-US" dirty="0"/>
+          </a:p>
         </p:txBody>
       </p:sp>
     </p:spTree>
@@ -6703,7 +6746,7 @@
           <a:p>
             <a:r>
               <a:rPr lang="en-US" dirty="0"/>
-              <a:t>Current Run Thomas is working on</a:t>
+              <a:t>Best Results</a:t>
             </a:r>
           </a:p>
         </p:txBody>
@@ -6724,31 +6767,28 @@
             <p:ph idx="1"/>
           </p:nvPr>
         </p:nvSpPr>
-        <p:spPr/>
+        <p:spPr>
+          <a:xfrm>
+            <a:off x="913795" y="1732449"/>
+            <a:ext cx="10353762" cy="4790271"/>
+          </a:xfrm>
+        </p:spPr>
         <p:txBody>
           <a:bodyPr>
-            <a:normAutofit fontScale="92500" lnSpcReduction="20000"/>
+            <a:normAutofit fontScale="70000" lnSpcReduction="20000"/>
           </a:bodyPr>
           <a:lstStyle/>
           <a:p>
             <a:r>
-              <a:rPr lang="en-US" dirty="0">
+              <a:rPr lang="en-US" sz="2900" dirty="0">
                 <a:effectLst/>
               </a:rPr>
-              <a:t>Current Run Params:</a:t>
-            </a:r>
-          </a:p>
-          <a:p>
-            <a:r>
-              <a:rPr lang="en-US" dirty="0">
-                <a:effectLst/>
-              </a:rPr>
-              <a:t>Run time/training duration = 48000</a:t>
-            </a:r>
-          </a:p>
-          <a:p>
-            <a:r>
-              <a:rPr lang="en-US" dirty="0">
+              <a:t>Run time/training duration = 24000</a:t>
+            </a:r>
+          </a:p>
+          <a:p>
+            <a:r>
+              <a:rPr lang="en-US" sz="2900" dirty="0">
                 <a:effectLst/>
               </a:rPr>
               <a:t>Discount factor = .99</a:t>
@@ -6756,24 +6796,15 @@
           </a:p>
           <a:p>
             <a:r>
-              <a:rPr lang="en-US" dirty="0">
+              <a:rPr lang="en-US" sz="2900" dirty="0">
                 <a:effectLst/>
               </a:rPr>
-              <a:t>Hidden layer type = </a:t>
-            </a:r>
-            <a:r>
-              <a:rPr lang="en-US" dirty="0" err="1">
-                <a:effectLst/>
-              </a:rPr>
-              <a:t>relu</a:t>
-            </a:r>
-            <a:endParaRPr lang="en-US" dirty="0">
-              <a:effectLst/>
-            </a:endParaRPr>
-          </a:p>
-          <a:p>
-            <a:r>
-              <a:rPr lang="en-US" dirty="0">
+              <a:t>Hidden layer type = tanh</a:t>
+            </a:r>
+          </a:p>
+          <a:p>
+            <a:r>
+              <a:rPr lang="en-US" sz="2900" dirty="0">
                 <a:effectLst/>
               </a:rPr>
               <a:t>Test duration = 100</a:t>
@@ -6781,39 +6812,39 @@
           </a:p>
           <a:p>
             <a:r>
-              <a:rPr lang="en-US" dirty="0">
+              <a:rPr lang="en-US" sz="2900" dirty="0">
                 <a:effectLst/>
               </a:rPr>
-              <a:t>Learning rate = .05</a:t>
-            </a:r>
-          </a:p>
-          <a:p>
-            <a:r>
-              <a:rPr lang="en-US" dirty="0">
+              <a:t>Learning rate = .03</a:t>
+            </a:r>
+          </a:p>
+          <a:p>
+            <a:r>
+              <a:rPr lang="en-US" sz="2900" dirty="0">
                 <a:effectLst/>
               </a:rPr>
-              <a:t>Reward timeout = 20</a:t>
-            </a:r>
-          </a:p>
-          <a:p>
-            <a:r>
-              <a:rPr lang="en-US" dirty="0">
+              <a:t>Reward timeout = 40</a:t>
+            </a:r>
+          </a:p>
+          <a:p>
+            <a:r>
+              <a:rPr lang="en-US" sz="2900" dirty="0">
                 <a:effectLst/>
               </a:rPr>
-              <a:t>Seed = 557935545</a:t>
-            </a:r>
-          </a:p>
-          <a:p>
-            <a:r>
-              <a:rPr lang="en-US" dirty="0">
+              <a:t>Seed = 38072947</a:t>
+            </a:r>
+          </a:p>
+          <a:p>
+            <a:r>
+              <a:rPr lang="en-US" sz="2900" dirty="0">
                 <a:effectLst/>
               </a:rPr>
-              <a:t>Num hidden layers  = 80</a:t>
-            </a:r>
-          </a:p>
-          <a:p>
-            <a:r>
-              <a:rPr lang="en-US" dirty="0">
+              <a:t>Num hidden layers  = 60</a:t>
+            </a:r>
+          </a:p>
+          <a:p>
+            <a:r>
+              <a:rPr lang="en-US" sz="2900" dirty="0">
                 <a:effectLst/>
               </a:rPr>
               <a:t>Respawn with = 15</a:t>
@@ -6821,10 +6852,32 @@
           </a:p>
           <a:p>
             <a:r>
-              <a:rPr lang="en-US" dirty="0">
+              <a:rPr lang="en-US" sz="2900" dirty="0">
                 <a:effectLst/>
               </a:rPr>
-              <a:t>Loss factor = 1.1</a:t>
+              <a:t>Loss factor = .8</a:t>
+            </a:r>
+          </a:p>
+          <a:p>
+            <a:endParaRPr lang="en-US" sz="2900" dirty="0">
+              <a:effectLst/>
+            </a:endParaRPr>
+          </a:p>
+          <a:p>
+            <a:pPr marL="36900" indent="0">
+              <a:buNone/>
+            </a:pPr>
+            <a:r>
+              <a:rPr lang="en-US" sz="2900" dirty="0">
+                <a:effectLst/>
+              </a:rPr>
+              <a:t>Avg Reward: .</a:t>
+            </a:r>
+            <a:r>
+              <a:rPr lang="en-US" sz="2900" b="1" dirty="0">
+                <a:effectLst/>
+              </a:rPr>
+              <a:t>0036</a:t>
             </a:r>
           </a:p>
           <a:p>
@@ -6836,6 +6889,106 @@
     <p:extLst>
       <p:ext uri="{BB962C8B-B14F-4D97-AF65-F5344CB8AC3E}">
         <p14:creationId xmlns:p14="http://schemas.microsoft.com/office/powerpoint/2010/main" val="3268148253"/>
+      </p:ext>
+    </p:extLst>
+  </p:cSld>
+  <p:clrMapOvr>
+    <a:masterClrMapping/>
+  </p:clrMapOvr>
+</p:sld>
+</file>
+
+<file path=ppt/slides/slide5.xml><?xml version="1.0" encoding="utf-8"?>
+<p:sld xmlns:a="http://schemas.openxmlformats.org/drawingml/2006/main" xmlns:r="http://schemas.openxmlformats.org/officeDocument/2006/relationships" xmlns:p="http://schemas.openxmlformats.org/presentationml/2006/main">
+  <p:cSld>
+    <p:spTree>
+      <p:nvGrpSpPr>
+        <p:cNvPr id="1" name=""/>
+        <p:cNvGrpSpPr/>
+        <p:nvPr/>
+      </p:nvGrpSpPr>
+      <p:grpSpPr>
+        <a:xfrm>
+          <a:off x="0" y="0"/>
+          <a:ext cx="0" cy="0"/>
+          <a:chOff x="0" y="0"/>
+          <a:chExt cx="0" cy="0"/>
+        </a:xfrm>
+      </p:grpSpPr>
+      <p:sp>
+        <p:nvSpPr>
+          <p:cNvPr id="2" name="Title 1">
+            <a:extLst>
+              <a:ext uri="{FF2B5EF4-FFF2-40B4-BE49-F238E27FC236}">
+                <a16:creationId xmlns:a16="http://schemas.microsoft.com/office/drawing/2014/main" id="{481CCF69-40F8-469A-8249-4621AEE13702}"/>
+              </a:ext>
+            </a:extLst>
+          </p:cNvPr>
+          <p:cNvSpPr>
+            <a:spLocks noGrp="1"/>
+          </p:cNvSpPr>
+          <p:nvPr>
+            <p:ph type="title"/>
+          </p:nvPr>
+        </p:nvSpPr>
+        <p:spPr/>
+        <p:txBody>
+          <a:bodyPr/>
+          <a:lstStyle/>
+          <a:p>
+            <a:r>
+              <a:rPr lang="en-US" dirty="0"/>
+              <a:t>Conclusion</a:t>
+            </a:r>
+          </a:p>
+        </p:txBody>
+      </p:sp>
+      <p:sp>
+        <p:nvSpPr>
+          <p:cNvPr id="3" name="Content Placeholder 2">
+            <a:extLst>
+              <a:ext uri="{FF2B5EF4-FFF2-40B4-BE49-F238E27FC236}">
+                <a16:creationId xmlns:a16="http://schemas.microsoft.com/office/drawing/2014/main" id="{528C55F2-14F3-464A-9B0C-BF461E8E4326}"/>
+              </a:ext>
+            </a:extLst>
+          </p:cNvPr>
+          <p:cNvSpPr>
+            <a:spLocks noGrp="1"/>
+          </p:cNvSpPr>
+          <p:nvPr>
+            <p:ph idx="1"/>
+          </p:nvPr>
+        </p:nvSpPr>
+        <p:spPr/>
+        <p:txBody>
+          <a:bodyPr/>
+          <a:lstStyle/>
+          <a:p>
+            <a:r>
+              <a:rPr lang="en-US" dirty="0"/>
+              <a:t>Bash and Multiple Parameters</a:t>
+            </a:r>
+          </a:p>
+          <a:p>
+            <a:r>
+              <a:rPr lang="en-US" dirty="0"/>
+              <a:t>Computationally </a:t>
+            </a:r>
+            <a:r>
+              <a:rPr lang="en-US" dirty="0" err="1"/>
+              <a:t>expnsive</a:t>
+            </a:r>
+            <a:endParaRPr lang="en-US" dirty="0"/>
+          </a:p>
+          <a:p>
+            <a:endParaRPr lang="en-US" dirty="0"/>
+          </a:p>
+        </p:txBody>
+      </p:sp>
+    </p:spTree>
+    <p:extLst>
+      <p:ext uri="{BB962C8B-B14F-4D97-AF65-F5344CB8AC3E}">
+        <p14:creationId xmlns:p14="http://schemas.microsoft.com/office/powerpoint/2010/main" val="22519026"/>
       </p:ext>
     </p:extLst>
   </p:cSld>

</xml_diff>